<commit_message>
module 2 for mvc 4 complete
</commit_message>
<xml_diff>
--- a/mvc/slides/02_Controllers.pptx
+++ b/mvc/slides/02_Controllers.pptx
@@ -5,10 +5,10 @@
     <p:sldMasterId id="2147483772" r:id="rId1"/>
   </p:sldMasterIdLst>
   <p:notesMasterIdLst>
-    <p:notesMasterId r:id="rId22"/>
+    <p:notesMasterId r:id="rId21"/>
   </p:notesMasterIdLst>
   <p:handoutMasterIdLst>
-    <p:handoutMasterId r:id="rId23"/>
+    <p:handoutMasterId r:id="rId22"/>
   </p:handoutMasterIdLst>
   <p:sldIdLst>
     <p:sldId id="327" r:id="rId2"/>
@@ -26,11 +26,10 @@
     <p:sldId id="376" r:id="rId14"/>
     <p:sldId id="377" r:id="rId15"/>
     <p:sldId id="378" r:id="rId16"/>
-    <p:sldId id="379" r:id="rId17"/>
-    <p:sldId id="380" r:id="rId18"/>
-    <p:sldId id="381" r:id="rId19"/>
-    <p:sldId id="382" r:id="rId20"/>
-    <p:sldId id="363" r:id="rId21"/>
+    <p:sldId id="380" r:id="rId17"/>
+    <p:sldId id="381" r:id="rId18"/>
+    <p:sldId id="382" r:id="rId19"/>
+    <p:sldId id="363" r:id="rId20"/>
   </p:sldIdLst>
   <p:sldSz cx="9144000" cy="6858000" type="screen4x3"/>
   <p:notesSz cx="7302500" cy="9588500"/>
@@ -253,7 +252,7 @@
               <a:pPr>
                 <a:defRPr/>
               </a:pPr>
-              <a:t>4/18/2012</a:t>
+              <a:t>8/15/2012</a:t>
             </a:fld>
             <a:endParaRPr lang="en-US"/>
           </a:p>
@@ -1113,7 +1112,7 @@
             <a:fld id="{6F8E712A-3391-44E3-B8E1-37AE61B13131}" type="slidenum">
               <a:rPr lang="en-US" smtClean="0"/>
               <a:pPr/>
-              <a:t>20</a:t>
+              <a:t>19</a:t>
             </a:fld>
             <a:endParaRPr lang="en-US" smtClean="0"/>
           </a:p>
@@ -3279,7 +3278,7 @@
                 <a:ea typeface="Calibri"/>
                 <a:cs typeface="Times New Roman"/>
               </a:rPr>
-              <a:t>AcceptVerbs</a:t>
+              <a:t>HttpPost</a:t>
             </a:r>
             <a:r>
               <a:rPr lang="en-US" sz="1800" b="0" dirty="0" smtClean="0">
@@ -3287,35 +3286,13 @@
                 <a:ea typeface="Calibri"/>
                 <a:cs typeface="Times New Roman"/>
               </a:rPr>
-              <a:t>(</a:t>
-            </a:r>
-            <a:r>
-              <a:rPr lang="en-US" sz="1800" b="0" dirty="0" err="1" smtClean="0">
-                <a:solidFill>
-                  <a:srgbClr val="2B91AF"/>
-                </a:solidFill>
-                <a:latin typeface="Consolas" pitchFamily="49" charset="0"/>
-                <a:ea typeface="Calibri"/>
-                <a:cs typeface="Times New Roman"/>
-              </a:rPr>
-              <a:t>HttpVerbs</a:t>
-            </a:r>
-            <a:r>
-              <a:rPr lang="en-US" sz="1800" b="0" dirty="0" err="1" smtClean="0">
-                <a:latin typeface="Consolas" pitchFamily="49" charset="0"/>
-                <a:ea typeface="Calibri"/>
-                <a:cs typeface="Times New Roman"/>
-              </a:rPr>
-              <a:t>.Post</a:t>
-            </a:r>
-            <a:r>
-              <a:rPr lang="en-US" sz="1800" b="0" dirty="0" smtClean="0">
-                <a:latin typeface="Consolas" pitchFamily="49" charset="0"/>
-                <a:ea typeface="Calibri"/>
-                <a:cs typeface="Times New Roman"/>
-              </a:rPr>
-              <a:t>)]</a:t>
-            </a:r>
+              <a:t>]</a:t>
+            </a:r>
+            <a:endParaRPr lang="en-US" sz="1800" b="0" dirty="0" smtClean="0">
+              <a:latin typeface="Consolas" pitchFamily="49" charset="0"/>
+              <a:ea typeface="Calibri"/>
+              <a:cs typeface="Times New Roman"/>
+            </a:endParaRPr>
           </a:p>
           <a:p>
             <a:pPr marL="0" marR="0" algn="l">
@@ -3748,7 +3725,7 @@
         </p:nvGraphicFramePr>
         <p:xfrm>
           <a:off x="609600" y="1524000"/>
-          <a:ext cx="8001000" cy="3032760"/>
+          <a:ext cx="8001000" cy="3302000"/>
         </p:xfrm>
         <a:graphic>
           <a:graphicData uri="http://schemas.openxmlformats.org/drawingml/2006/table">
@@ -5410,7 +5387,7 @@
         </p:nvGraphicFramePr>
         <p:xfrm>
           <a:off x="914400" y="1905000"/>
-          <a:ext cx="7239000" cy="3850479"/>
+          <a:ext cx="7239000" cy="4183042"/>
         </p:xfrm>
         <a:graphic>
           <a:graphicData uri="http://schemas.openxmlformats.org/drawingml/2006/table">
@@ -6460,63 +6437,18 @@
             <a:pPr lvl="1"/>
             <a:r>
               <a:rPr lang="en-US" dirty="0" smtClean="0"/>
-              <a:t>Parallelism more valuable than simplicity</a:t>
-            </a:r>
-          </a:p>
-          <a:p>
+              <a:t>Parallelism more valuable than </a:t>
+            </a:r>
             <a:r>
               <a:rPr lang="en-US" dirty="0" smtClean="0"/>
-              <a:t>How to use?</a:t>
+              <a:t>simplicity</a:t>
             </a:r>
           </a:p>
           <a:p>
             <a:pPr lvl="1"/>
             <a:r>
               <a:rPr lang="en-US" dirty="0" smtClean="0"/>
-              <a:t>Derive from </a:t>
-            </a:r>
-            <a:r>
-              <a:rPr lang="en-US" dirty="0" err="1" smtClean="0"/>
-              <a:t>AsyncController</a:t>
-            </a:r>
-            <a:endParaRPr lang="en-US" dirty="0" smtClean="0"/>
-          </a:p>
-          <a:p>
-            <a:pPr lvl="1"/>
-            <a:r>
-              <a:rPr lang="en-US" dirty="0" smtClean="0"/>
-              <a:t>Two methods for each action (</a:t>
-            </a:r>
-            <a:r>
-              <a:rPr lang="en-US" i="1" dirty="0" err="1" smtClean="0"/>
-              <a:t>Action</a:t>
-            </a:r>
-            <a:r>
-              <a:rPr lang="en-US" dirty="0" err="1" smtClean="0"/>
-              <a:t>Async</a:t>
-            </a:r>
-            <a:r>
-              <a:rPr lang="en-US" dirty="0" smtClean="0"/>
-              <a:t> and </a:t>
-            </a:r>
-            <a:r>
-              <a:rPr lang="en-US" i="1" dirty="0" err="1" smtClean="0"/>
-              <a:t>Action</a:t>
-            </a:r>
-            <a:r>
-              <a:rPr lang="en-US" dirty="0" err="1" smtClean="0"/>
-              <a:t>Completed</a:t>
-            </a:r>
-            <a:r>
-              <a:rPr lang="en-US" dirty="0" smtClean="0"/>
-              <a:t>)</a:t>
-            </a:r>
-          </a:p>
-          <a:p>
-            <a:pPr lvl="1"/>
-            <a:r>
-              <a:rPr lang="en-US" dirty="0" smtClean="0"/>
-              <a:t>Replace blocking I/O calls with </a:t>
+              <a:t>C# 5 </a:t>
             </a:r>
             <a:r>
               <a:rPr lang="en-US" dirty="0" err="1" smtClean="0"/>
@@ -6524,24 +6456,399 @@
             </a:r>
             <a:r>
               <a:rPr lang="en-US" dirty="0" smtClean="0"/>
-              <a:t> versions</a:t>
-            </a:r>
-          </a:p>
-          <a:p>
-            <a:pPr lvl="1"/>
-            <a:r>
-              <a:rPr lang="en-US" dirty="0" smtClean="0"/>
-              <a:t>Use </a:t>
-            </a:r>
-            <a:r>
-              <a:rPr lang="en-US" dirty="0" err="1" smtClean="0"/>
-              <a:t>AsyncManager</a:t>
-            </a:r>
-            <a:r>
-              <a:rPr lang="en-US" dirty="0" smtClean="0"/>
-              <a:t> to coordinate with MVC runtime</a:t>
-            </a:r>
-            <a:endParaRPr lang="en-US" dirty="0"/>
+              <a:t> / await make them easy</a:t>
+            </a:r>
+            <a:endParaRPr lang="en-US" dirty="0" smtClean="0"/>
+          </a:p>
+        </p:txBody>
+      </p:sp>
+      <p:sp>
+        <p:nvSpPr>
+          <p:cNvPr id="4" name="Text Placeholder 2"/>
+          <p:cNvSpPr txBox="1">
+            <a:spLocks/>
+          </p:cNvSpPr>
+          <p:nvPr/>
+        </p:nvSpPr>
+        <p:spPr bwMode="auto">
+          <a:xfrm>
+            <a:off x="990600" y="2971800"/>
+            <a:ext cx="6248400" cy="2514600"/>
+          </a:xfrm>
+          <a:prstGeom prst="rect">
+            <a:avLst/>
+          </a:prstGeom>
+          <a:solidFill>
+            <a:schemeClr val="accent2"/>
+          </a:solidFill>
+          <a:ln w="9525">
+            <a:solidFill>
+              <a:schemeClr val="tx1"/>
+            </a:solidFill>
+            <a:miter lim="800000"/>
+            <a:headEnd/>
+            <a:tailEnd/>
+          </a:ln>
+        </p:spPr>
+        <p:txBody>
+          <a:bodyPr vert="horz" wrap="square" lIns="91440" tIns="45720" rIns="91440" bIns="45720" numCol="1" anchor="t" anchorCtr="0" compatLnSpc="1">
+            <a:prstTxWarp prst="textNoShape">
+              <a:avLst/>
+            </a:prstTxWarp>
+          </a:bodyPr>
+          <a:lstStyle/>
+          <a:p>
+            <a:pPr marL="0" marR="0" algn="l">
+              <a:lnSpc>
+                <a:spcPct val="115000"/>
+              </a:lnSpc>
+              <a:spcBef>
+                <a:spcPts val="0"/>
+              </a:spcBef>
+              <a:spcAft>
+                <a:spcPts val="0"/>
+              </a:spcAft>
+            </a:pPr>
+            <a:r>
+              <a:rPr lang="en-US" sz="1400" dirty="0" smtClean="0">
+                <a:solidFill>
+                  <a:srgbClr val="0000FF"/>
+                </a:solidFill>
+                <a:latin typeface="Consolas"/>
+                <a:ea typeface="Calibri"/>
+                <a:cs typeface="Times New Roman"/>
+              </a:rPr>
+              <a:t>Public </a:t>
+            </a:r>
+            <a:r>
+              <a:rPr lang="en-US" sz="1400" dirty="0" err="1" smtClean="0">
+                <a:solidFill>
+                  <a:srgbClr val="0000FF"/>
+                </a:solidFill>
+                <a:latin typeface="Consolas"/>
+                <a:ea typeface="Calibri"/>
+                <a:cs typeface="Times New Roman"/>
+              </a:rPr>
+              <a:t>async</a:t>
+            </a:r>
+            <a:r>
+              <a:rPr lang="en-US" sz="1400" dirty="0" smtClean="0">
+                <a:latin typeface="Consolas"/>
+                <a:ea typeface="Calibri"/>
+                <a:cs typeface="Times New Roman"/>
+              </a:rPr>
+              <a:t> </a:t>
+            </a:r>
+            <a:r>
+              <a:rPr lang="en-US" sz="1400" dirty="0" err="1" smtClean="0">
+                <a:solidFill>
+                  <a:srgbClr val="2B91AF"/>
+                </a:solidFill>
+                <a:latin typeface="Consolas"/>
+                <a:ea typeface="Calibri"/>
+                <a:cs typeface="Times New Roman"/>
+              </a:rPr>
+              <a:t>ActionResult</a:t>
+            </a:r>
+            <a:r>
+              <a:rPr lang="en-US" sz="1400" dirty="0" smtClean="0">
+                <a:latin typeface="Consolas"/>
+                <a:ea typeface="Calibri"/>
+                <a:cs typeface="Times New Roman"/>
+              </a:rPr>
+              <a:t> </a:t>
+            </a:r>
+            <a:r>
+              <a:rPr lang="en-US" sz="1400" dirty="0">
+                <a:latin typeface="Consolas"/>
+                <a:ea typeface="Calibri"/>
+                <a:cs typeface="Times New Roman"/>
+              </a:rPr>
+              <a:t>Index()</a:t>
+            </a:r>
+            <a:endParaRPr lang="en-US" sz="1800" dirty="0">
+              <a:latin typeface="Calibri"/>
+              <a:ea typeface="Calibri"/>
+              <a:cs typeface="Times New Roman"/>
+            </a:endParaRPr>
+          </a:p>
+          <a:p>
+            <a:pPr marL="0" marR="0" algn="l">
+              <a:lnSpc>
+                <a:spcPct val="115000"/>
+              </a:lnSpc>
+              <a:spcBef>
+                <a:spcPts val="0"/>
+              </a:spcBef>
+              <a:spcAft>
+                <a:spcPts val="0"/>
+              </a:spcAft>
+            </a:pPr>
+            <a:r>
+              <a:rPr lang="en-US" sz="1400" dirty="0">
+                <a:latin typeface="Consolas"/>
+                <a:ea typeface="Calibri"/>
+                <a:cs typeface="Times New Roman"/>
+              </a:rPr>
+              <a:t>{</a:t>
+            </a:r>
+            <a:endParaRPr lang="en-US" sz="1800" dirty="0">
+              <a:latin typeface="Calibri"/>
+              <a:ea typeface="Calibri"/>
+              <a:cs typeface="Times New Roman"/>
+            </a:endParaRPr>
+          </a:p>
+          <a:p>
+            <a:pPr marL="0" marR="0" algn="l">
+              <a:lnSpc>
+                <a:spcPct val="115000"/>
+              </a:lnSpc>
+              <a:spcBef>
+                <a:spcPts val="0"/>
+              </a:spcBef>
+              <a:spcAft>
+                <a:spcPts val="0"/>
+              </a:spcAft>
+            </a:pPr>
+            <a:r>
+              <a:rPr lang="en-US" sz="1400" dirty="0">
+                <a:latin typeface="Consolas"/>
+                <a:ea typeface="Calibri"/>
+                <a:cs typeface="Times New Roman"/>
+              </a:rPr>
+              <a:t>    </a:t>
+            </a:r>
+            <a:r>
+              <a:rPr lang="en-US" sz="1400" dirty="0" err="1">
+                <a:solidFill>
+                  <a:srgbClr val="0000FF"/>
+                </a:solidFill>
+                <a:latin typeface="Consolas"/>
+                <a:ea typeface="Calibri"/>
+                <a:cs typeface="Times New Roman"/>
+              </a:rPr>
+              <a:t>var</a:t>
+            </a:r>
+            <a:r>
+              <a:rPr lang="en-US" sz="1400" dirty="0">
+                <a:latin typeface="Consolas"/>
+                <a:ea typeface="Calibri"/>
+                <a:cs typeface="Times New Roman"/>
+              </a:rPr>
+              <a:t> client = </a:t>
+            </a:r>
+            <a:r>
+              <a:rPr lang="en-US" sz="1400" dirty="0">
+                <a:solidFill>
+                  <a:srgbClr val="0000FF"/>
+                </a:solidFill>
+                <a:latin typeface="Consolas"/>
+                <a:ea typeface="Calibri"/>
+                <a:cs typeface="Times New Roman"/>
+              </a:rPr>
+              <a:t>new</a:t>
+            </a:r>
+            <a:r>
+              <a:rPr lang="en-US" sz="1400" dirty="0">
+                <a:latin typeface="Consolas"/>
+                <a:ea typeface="Calibri"/>
+                <a:cs typeface="Times New Roman"/>
+              </a:rPr>
+              <a:t> </a:t>
+            </a:r>
+            <a:r>
+              <a:rPr lang="en-US" sz="1400" dirty="0" err="1">
+                <a:solidFill>
+                  <a:srgbClr val="2B91AF"/>
+                </a:solidFill>
+                <a:latin typeface="Consolas"/>
+                <a:ea typeface="Calibri"/>
+                <a:cs typeface="Times New Roman"/>
+              </a:rPr>
+              <a:t>NewsServiceClient</a:t>
+            </a:r>
+            <a:r>
+              <a:rPr lang="en-US" sz="1400" dirty="0">
+                <a:latin typeface="Consolas"/>
+                <a:ea typeface="Calibri"/>
+                <a:cs typeface="Times New Roman"/>
+              </a:rPr>
+              <a:t>();</a:t>
+            </a:r>
+            <a:endParaRPr lang="en-US" sz="1800" dirty="0">
+              <a:latin typeface="Calibri"/>
+              <a:ea typeface="Calibri"/>
+              <a:cs typeface="Times New Roman"/>
+            </a:endParaRPr>
+          </a:p>
+          <a:p>
+            <a:pPr marL="0" marR="0" algn="l">
+              <a:lnSpc>
+                <a:spcPct val="115000"/>
+              </a:lnSpc>
+              <a:spcBef>
+                <a:spcPts val="0"/>
+              </a:spcBef>
+              <a:spcAft>
+                <a:spcPts val="0"/>
+              </a:spcAft>
+            </a:pPr>
+            <a:r>
+              <a:rPr lang="en-US" sz="1400" dirty="0">
+                <a:latin typeface="Consolas"/>
+                <a:ea typeface="Calibri"/>
+                <a:cs typeface="Times New Roman"/>
+              </a:rPr>
+              <a:t>    </a:t>
+            </a:r>
+            <a:r>
+              <a:rPr lang="en-US" sz="1400" dirty="0" err="1">
+                <a:solidFill>
+                  <a:srgbClr val="0000FF"/>
+                </a:solidFill>
+                <a:latin typeface="Consolas"/>
+                <a:ea typeface="Calibri"/>
+                <a:cs typeface="Times New Roman"/>
+              </a:rPr>
+              <a:t>var</a:t>
+            </a:r>
+            <a:r>
+              <a:rPr lang="en-US" sz="1400" dirty="0">
+                <a:latin typeface="Consolas"/>
+                <a:ea typeface="Calibri"/>
+                <a:cs typeface="Times New Roman"/>
+              </a:rPr>
+              <a:t> news = </a:t>
+            </a:r>
+            <a:r>
+              <a:rPr lang="en-US" sz="1400" dirty="0" smtClean="0">
+                <a:solidFill>
+                  <a:srgbClr val="0000FF"/>
+                </a:solidFill>
+                <a:latin typeface="Consolas"/>
+                <a:ea typeface="Calibri"/>
+                <a:cs typeface="Times New Roman"/>
+              </a:rPr>
+              <a:t>await </a:t>
+            </a:r>
+            <a:r>
+              <a:rPr lang="en-US" sz="1400" dirty="0" err="1" smtClean="0">
+                <a:latin typeface="Consolas"/>
+                <a:ea typeface="Calibri"/>
+                <a:cs typeface="Times New Roman"/>
+              </a:rPr>
+              <a:t>client.GetNews</a:t>
+            </a:r>
+            <a:r>
+              <a:rPr lang="en-US" sz="1400" dirty="0">
+                <a:latin typeface="Consolas"/>
+                <a:ea typeface="Calibri"/>
+                <a:cs typeface="Times New Roman"/>
+              </a:rPr>
+              <a:t>();</a:t>
+            </a:r>
+            <a:endParaRPr lang="en-US" sz="1800" dirty="0">
+              <a:latin typeface="Calibri"/>
+              <a:ea typeface="Calibri"/>
+              <a:cs typeface="Times New Roman"/>
+            </a:endParaRPr>
+          </a:p>
+          <a:p>
+            <a:pPr marL="0" marR="0" algn="l">
+              <a:lnSpc>
+                <a:spcPct val="115000"/>
+              </a:lnSpc>
+              <a:spcBef>
+                <a:spcPts val="0"/>
+              </a:spcBef>
+              <a:spcAft>
+                <a:spcPts val="0"/>
+              </a:spcAft>
+            </a:pPr>
+            <a:r>
+              <a:rPr lang="en-US" sz="1400" dirty="0">
+                <a:latin typeface="Consolas"/>
+                <a:ea typeface="Calibri"/>
+                <a:cs typeface="Times New Roman"/>
+              </a:rPr>
+              <a:t>    </a:t>
+            </a:r>
+            <a:r>
+              <a:rPr lang="en-US" sz="1400" dirty="0">
+                <a:solidFill>
+                  <a:srgbClr val="0000FF"/>
+                </a:solidFill>
+                <a:latin typeface="Consolas"/>
+                <a:ea typeface="Calibri"/>
+                <a:cs typeface="Times New Roman"/>
+              </a:rPr>
+              <a:t>return</a:t>
+            </a:r>
+            <a:r>
+              <a:rPr lang="en-US" sz="1400" dirty="0">
+                <a:latin typeface="Consolas"/>
+                <a:ea typeface="Calibri"/>
+                <a:cs typeface="Times New Roman"/>
+              </a:rPr>
+              <a:t> View(news);</a:t>
+            </a:r>
+            <a:endParaRPr lang="en-US" sz="1800" dirty="0">
+              <a:latin typeface="Calibri"/>
+              <a:ea typeface="Calibri"/>
+              <a:cs typeface="Times New Roman"/>
+            </a:endParaRPr>
+          </a:p>
+          <a:p>
+            <a:pPr marL="0" marR="0" algn="l">
+              <a:lnSpc>
+                <a:spcPct val="115000"/>
+              </a:lnSpc>
+              <a:spcBef>
+                <a:spcPts val="0"/>
+              </a:spcBef>
+              <a:spcAft>
+                <a:spcPts val="0"/>
+              </a:spcAft>
+            </a:pPr>
+            <a:r>
+              <a:rPr lang="en-US" sz="1400" dirty="0">
+                <a:latin typeface="Consolas"/>
+                <a:ea typeface="Calibri"/>
+                <a:cs typeface="Times New Roman"/>
+              </a:rPr>
+              <a:t>}</a:t>
+            </a:r>
+            <a:endParaRPr lang="en-US" sz="1800" dirty="0">
+              <a:latin typeface="Calibri"/>
+              <a:ea typeface="Calibri"/>
+              <a:cs typeface="Times New Roman"/>
+            </a:endParaRPr>
+          </a:p>
+          <a:p>
+            <a:pPr marL="0" marR="0" algn="l">
+              <a:lnSpc>
+                <a:spcPct val="115000"/>
+              </a:lnSpc>
+              <a:spcBef>
+                <a:spcPts val="0"/>
+              </a:spcBef>
+              <a:spcAft>
+                <a:spcPts val="0"/>
+              </a:spcAft>
+            </a:pPr>
+            <a:endParaRPr kumimoji="0" lang="en-US" sz="1400" b="0" i="0" u="none" strike="noStrike" kern="0" cap="none" spc="0" normalizeH="0" baseline="0" noProof="0" dirty="0">
+              <a:ln>
+                <a:noFill/>
+              </a:ln>
+              <a:solidFill>
+                <a:schemeClr val="tx1"/>
+              </a:solidFill>
+              <a:effectLst/>
+              <a:uLnTx/>
+              <a:uFillTx/>
+              <a:latin typeface="Consolas" pitchFamily="49" charset="0"/>
+              <a:cs typeface="Segoe UI" pitchFamily="34" charset="0"/>
+            </a:endParaRPr>
           </a:p>
         </p:txBody>
       </p:sp>
@@ -6569,1227 +6876,6 @@
 </file>
 
 <file path=ppt/slides/slide16.xml><?xml version="1.0" encoding="utf-8"?>
-<p:sld xmlns:a="http://schemas.openxmlformats.org/drawingml/2006/main" xmlns:r="http://schemas.openxmlformats.org/officeDocument/2006/relationships" xmlns:p="http://schemas.openxmlformats.org/presentationml/2006/main">
-  <p:cSld>
-    <p:spTree>
-      <p:nvGrpSpPr>
-        <p:cNvPr id="1" name=""/>
-        <p:cNvGrpSpPr/>
-        <p:nvPr/>
-      </p:nvGrpSpPr>
-      <p:grpSpPr>
-        <a:xfrm>
-          <a:off x="0" y="0"/>
-          <a:ext cx="0" cy="0"/>
-          <a:chOff x="0" y="0"/>
-          <a:chExt cx="0" cy="0"/>
-        </a:xfrm>
-      </p:grpSpPr>
-      <p:sp>
-        <p:nvSpPr>
-          <p:cNvPr id="2" name="Title 1"/>
-          <p:cNvSpPr>
-            <a:spLocks noGrp="1"/>
-          </p:cNvSpPr>
-          <p:nvPr>
-            <p:ph type="title"/>
-          </p:nvPr>
-        </p:nvSpPr>
-        <p:spPr/>
-        <p:txBody>
-          <a:bodyPr/>
-          <a:lstStyle/>
-          <a:p>
-            <a:r>
-              <a:rPr lang="en-US" dirty="0" smtClean="0"/>
-              <a:t>Sync -&gt; </a:t>
-            </a:r>
-            <a:r>
-              <a:rPr lang="en-US" dirty="0" err="1" smtClean="0"/>
-              <a:t>Async</a:t>
-            </a:r>
-            <a:endParaRPr lang="en-US" dirty="0"/>
-          </a:p>
-        </p:txBody>
-      </p:sp>
-      <p:sp>
-        <p:nvSpPr>
-          <p:cNvPr id="4" name="Text Placeholder 2"/>
-          <p:cNvSpPr txBox="1">
-            <a:spLocks/>
-          </p:cNvSpPr>
-          <p:nvPr/>
-        </p:nvSpPr>
-        <p:spPr bwMode="auto">
-          <a:xfrm>
-            <a:off x="228600" y="975360"/>
-            <a:ext cx="4267200" cy="1524000"/>
-          </a:xfrm>
-          <a:prstGeom prst="rect">
-            <a:avLst/>
-          </a:prstGeom>
-          <a:solidFill>
-            <a:schemeClr val="accent2"/>
-          </a:solidFill>
-          <a:ln w="9525">
-            <a:solidFill>
-              <a:schemeClr val="tx1"/>
-            </a:solidFill>
-            <a:miter lim="800000"/>
-            <a:headEnd/>
-            <a:tailEnd/>
-          </a:ln>
-        </p:spPr>
-        <p:txBody>
-          <a:bodyPr vert="horz" wrap="square" lIns="91440" tIns="45720" rIns="91440" bIns="45720" numCol="1" anchor="t" anchorCtr="0" compatLnSpc="1">
-            <a:prstTxWarp prst="textNoShape">
-              <a:avLst/>
-            </a:prstTxWarp>
-          </a:bodyPr>
-          <a:lstStyle/>
-          <a:p>
-            <a:pPr marL="0" marR="0" algn="l">
-              <a:lnSpc>
-                <a:spcPct val="115000"/>
-              </a:lnSpc>
-              <a:spcBef>
-                <a:spcPts val="0"/>
-              </a:spcBef>
-              <a:spcAft>
-                <a:spcPts val="0"/>
-              </a:spcAft>
-            </a:pPr>
-            <a:r>
-              <a:rPr lang="en-US" sz="1400" dirty="0">
-                <a:solidFill>
-                  <a:srgbClr val="0000FF"/>
-                </a:solidFill>
-                <a:latin typeface="Consolas"/>
-                <a:ea typeface="Calibri"/>
-                <a:cs typeface="Times New Roman"/>
-              </a:rPr>
-              <a:t>public</a:t>
-            </a:r>
-            <a:r>
-              <a:rPr lang="en-US" sz="1400" dirty="0">
-                <a:latin typeface="Consolas"/>
-                <a:ea typeface="Calibri"/>
-                <a:cs typeface="Times New Roman"/>
-              </a:rPr>
-              <a:t> </a:t>
-            </a:r>
-            <a:r>
-              <a:rPr lang="en-US" sz="1400" dirty="0" err="1">
-                <a:solidFill>
-                  <a:srgbClr val="2B91AF"/>
-                </a:solidFill>
-                <a:latin typeface="Consolas"/>
-                <a:ea typeface="Calibri"/>
-                <a:cs typeface="Times New Roman"/>
-              </a:rPr>
-              <a:t>ActionResult</a:t>
-            </a:r>
-            <a:r>
-              <a:rPr lang="en-US" sz="1400" dirty="0">
-                <a:latin typeface="Consolas"/>
-                <a:ea typeface="Calibri"/>
-                <a:cs typeface="Times New Roman"/>
-              </a:rPr>
-              <a:t> Index()</a:t>
-            </a:r>
-            <a:endParaRPr lang="en-US" sz="1800" dirty="0">
-              <a:latin typeface="Calibri"/>
-              <a:ea typeface="Calibri"/>
-              <a:cs typeface="Times New Roman"/>
-            </a:endParaRPr>
-          </a:p>
-          <a:p>
-            <a:pPr marL="0" marR="0" algn="l">
-              <a:lnSpc>
-                <a:spcPct val="115000"/>
-              </a:lnSpc>
-              <a:spcBef>
-                <a:spcPts val="0"/>
-              </a:spcBef>
-              <a:spcAft>
-                <a:spcPts val="0"/>
-              </a:spcAft>
-            </a:pPr>
-            <a:r>
-              <a:rPr lang="en-US" sz="1400" dirty="0">
-                <a:latin typeface="Consolas"/>
-                <a:ea typeface="Calibri"/>
-                <a:cs typeface="Times New Roman"/>
-              </a:rPr>
-              <a:t>{</a:t>
-            </a:r>
-            <a:endParaRPr lang="en-US" sz="1800" dirty="0">
-              <a:latin typeface="Calibri"/>
-              <a:ea typeface="Calibri"/>
-              <a:cs typeface="Times New Roman"/>
-            </a:endParaRPr>
-          </a:p>
-          <a:p>
-            <a:pPr marL="0" marR="0" algn="l">
-              <a:lnSpc>
-                <a:spcPct val="115000"/>
-              </a:lnSpc>
-              <a:spcBef>
-                <a:spcPts val="0"/>
-              </a:spcBef>
-              <a:spcAft>
-                <a:spcPts val="0"/>
-              </a:spcAft>
-            </a:pPr>
-            <a:r>
-              <a:rPr lang="en-US" sz="1400" dirty="0">
-                <a:latin typeface="Consolas"/>
-                <a:ea typeface="Calibri"/>
-                <a:cs typeface="Times New Roman"/>
-              </a:rPr>
-              <a:t>    </a:t>
-            </a:r>
-            <a:r>
-              <a:rPr lang="en-US" sz="1400" dirty="0" err="1">
-                <a:solidFill>
-                  <a:srgbClr val="0000FF"/>
-                </a:solidFill>
-                <a:latin typeface="Consolas"/>
-                <a:ea typeface="Calibri"/>
-                <a:cs typeface="Times New Roman"/>
-              </a:rPr>
-              <a:t>var</a:t>
-            </a:r>
-            <a:r>
-              <a:rPr lang="en-US" sz="1400" dirty="0">
-                <a:latin typeface="Consolas"/>
-                <a:ea typeface="Calibri"/>
-                <a:cs typeface="Times New Roman"/>
-              </a:rPr>
-              <a:t> client = </a:t>
-            </a:r>
-            <a:r>
-              <a:rPr lang="en-US" sz="1400" dirty="0">
-                <a:solidFill>
-                  <a:srgbClr val="0000FF"/>
-                </a:solidFill>
-                <a:latin typeface="Consolas"/>
-                <a:ea typeface="Calibri"/>
-                <a:cs typeface="Times New Roman"/>
-              </a:rPr>
-              <a:t>new</a:t>
-            </a:r>
-            <a:r>
-              <a:rPr lang="en-US" sz="1400" dirty="0">
-                <a:latin typeface="Consolas"/>
-                <a:ea typeface="Calibri"/>
-                <a:cs typeface="Times New Roman"/>
-              </a:rPr>
-              <a:t> </a:t>
-            </a:r>
-            <a:r>
-              <a:rPr lang="en-US" sz="1400" dirty="0" err="1">
-                <a:solidFill>
-                  <a:srgbClr val="2B91AF"/>
-                </a:solidFill>
-                <a:latin typeface="Consolas"/>
-                <a:ea typeface="Calibri"/>
-                <a:cs typeface="Times New Roman"/>
-              </a:rPr>
-              <a:t>NewsServiceClient</a:t>
-            </a:r>
-            <a:r>
-              <a:rPr lang="en-US" sz="1400" dirty="0">
-                <a:latin typeface="Consolas"/>
-                <a:ea typeface="Calibri"/>
-                <a:cs typeface="Times New Roman"/>
-              </a:rPr>
-              <a:t>();</a:t>
-            </a:r>
-            <a:endParaRPr lang="en-US" sz="1800" dirty="0">
-              <a:latin typeface="Calibri"/>
-              <a:ea typeface="Calibri"/>
-              <a:cs typeface="Times New Roman"/>
-            </a:endParaRPr>
-          </a:p>
-          <a:p>
-            <a:pPr marL="0" marR="0" algn="l">
-              <a:lnSpc>
-                <a:spcPct val="115000"/>
-              </a:lnSpc>
-              <a:spcBef>
-                <a:spcPts val="0"/>
-              </a:spcBef>
-              <a:spcAft>
-                <a:spcPts val="0"/>
-              </a:spcAft>
-            </a:pPr>
-            <a:r>
-              <a:rPr lang="en-US" sz="1400" dirty="0">
-                <a:latin typeface="Consolas"/>
-                <a:ea typeface="Calibri"/>
-                <a:cs typeface="Times New Roman"/>
-              </a:rPr>
-              <a:t>    </a:t>
-            </a:r>
-            <a:r>
-              <a:rPr lang="en-US" sz="1400" dirty="0" err="1">
-                <a:solidFill>
-                  <a:srgbClr val="0000FF"/>
-                </a:solidFill>
-                <a:latin typeface="Consolas"/>
-                <a:ea typeface="Calibri"/>
-                <a:cs typeface="Times New Roman"/>
-              </a:rPr>
-              <a:t>var</a:t>
-            </a:r>
-            <a:r>
-              <a:rPr lang="en-US" sz="1400" dirty="0">
-                <a:latin typeface="Consolas"/>
-                <a:ea typeface="Calibri"/>
-                <a:cs typeface="Times New Roman"/>
-              </a:rPr>
-              <a:t> news = </a:t>
-            </a:r>
-            <a:r>
-              <a:rPr lang="en-US" sz="1400" dirty="0" err="1">
-                <a:latin typeface="Consolas"/>
-                <a:ea typeface="Calibri"/>
-                <a:cs typeface="Times New Roman"/>
-              </a:rPr>
-              <a:t>client.GetNews</a:t>
-            </a:r>
-            <a:r>
-              <a:rPr lang="en-US" sz="1400" dirty="0">
-                <a:latin typeface="Consolas"/>
-                <a:ea typeface="Calibri"/>
-                <a:cs typeface="Times New Roman"/>
-              </a:rPr>
-              <a:t>();</a:t>
-            </a:r>
-            <a:endParaRPr lang="en-US" sz="1800" dirty="0">
-              <a:latin typeface="Calibri"/>
-              <a:ea typeface="Calibri"/>
-              <a:cs typeface="Times New Roman"/>
-            </a:endParaRPr>
-          </a:p>
-          <a:p>
-            <a:pPr marL="0" marR="0" algn="l">
-              <a:lnSpc>
-                <a:spcPct val="115000"/>
-              </a:lnSpc>
-              <a:spcBef>
-                <a:spcPts val="0"/>
-              </a:spcBef>
-              <a:spcAft>
-                <a:spcPts val="0"/>
-              </a:spcAft>
-            </a:pPr>
-            <a:r>
-              <a:rPr lang="en-US" sz="1400" dirty="0">
-                <a:latin typeface="Consolas"/>
-                <a:ea typeface="Calibri"/>
-                <a:cs typeface="Times New Roman"/>
-              </a:rPr>
-              <a:t>    </a:t>
-            </a:r>
-            <a:r>
-              <a:rPr lang="en-US" sz="1400" dirty="0">
-                <a:solidFill>
-                  <a:srgbClr val="0000FF"/>
-                </a:solidFill>
-                <a:latin typeface="Consolas"/>
-                <a:ea typeface="Calibri"/>
-                <a:cs typeface="Times New Roman"/>
-              </a:rPr>
-              <a:t>return</a:t>
-            </a:r>
-            <a:r>
-              <a:rPr lang="en-US" sz="1400" dirty="0">
-                <a:latin typeface="Consolas"/>
-                <a:ea typeface="Calibri"/>
-                <a:cs typeface="Times New Roman"/>
-              </a:rPr>
-              <a:t> View(news);</a:t>
-            </a:r>
-            <a:endParaRPr lang="en-US" sz="1800" dirty="0">
-              <a:latin typeface="Calibri"/>
-              <a:ea typeface="Calibri"/>
-              <a:cs typeface="Times New Roman"/>
-            </a:endParaRPr>
-          </a:p>
-          <a:p>
-            <a:pPr marL="0" marR="0" algn="l">
-              <a:lnSpc>
-                <a:spcPct val="115000"/>
-              </a:lnSpc>
-              <a:spcBef>
-                <a:spcPts val="0"/>
-              </a:spcBef>
-              <a:spcAft>
-                <a:spcPts val="0"/>
-              </a:spcAft>
-            </a:pPr>
-            <a:r>
-              <a:rPr lang="en-US" sz="1400" dirty="0">
-                <a:latin typeface="Consolas"/>
-                <a:ea typeface="Calibri"/>
-                <a:cs typeface="Times New Roman"/>
-              </a:rPr>
-              <a:t>}</a:t>
-            </a:r>
-            <a:endParaRPr lang="en-US" sz="1800" dirty="0">
-              <a:latin typeface="Calibri"/>
-              <a:ea typeface="Calibri"/>
-              <a:cs typeface="Times New Roman"/>
-            </a:endParaRPr>
-          </a:p>
-          <a:p>
-            <a:pPr marL="0" marR="0" algn="l">
-              <a:lnSpc>
-                <a:spcPct val="115000"/>
-              </a:lnSpc>
-              <a:spcBef>
-                <a:spcPts val="0"/>
-              </a:spcBef>
-              <a:spcAft>
-                <a:spcPts val="0"/>
-              </a:spcAft>
-            </a:pPr>
-            <a:endParaRPr kumimoji="0" lang="en-US" sz="1400" b="0" i="0" u="none" strike="noStrike" kern="0" cap="none" spc="0" normalizeH="0" baseline="0" noProof="0" dirty="0">
-              <a:ln>
-                <a:noFill/>
-              </a:ln>
-              <a:solidFill>
-                <a:schemeClr val="tx1"/>
-              </a:solidFill>
-              <a:effectLst/>
-              <a:uLnTx/>
-              <a:uFillTx/>
-              <a:latin typeface="Consolas" pitchFamily="49" charset="0"/>
-              <a:cs typeface="Segoe UI" pitchFamily="34" charset="0"/>
-            </a:endParaRPr>
-          </a:p>
-        </p:txBody>
-      </p:sp>
-      <p:sp>
-        <p:nvSpPr>
-          <p:cNvPr id="5" name="Text Placeholder 2"/>
-          <p:cNvSpPr txBox="1">
-            <a:spLocks/>
-          </p:cNvSpPr>
-          <p:nvPr/>
-        </p:nvSpPr>
-        <p:spPr bwMode="auto">
-          <a:xfrm>
-            <a:off x="215536" y="2895600"/>
-            <a:ext cx="5956664" cy="2667000"/>
-          </a:xfrm>
-          <a:prstGeom prst="rect">
-            <a:avLst/>
-          </a:prstGeom>
-          <a:solidFill>
-            <a:schemeClr val="accent3"/>
-          </a:solidFill>
-          <a:ln w="9525">
-            <a:solidFill>
-              <a:schemeClr val="tx1"/>
-            </a:solidFill>
-            <a:miter lim="800000"/>
-            <a:headEnd/>
-            <a:tailEnd/>
-          </a:ln>
-        </p:spPr>
-        <p:txBody>
-          <a:bodyPr vert="horz" wrap="square" lIns="91440" tIns="45720" rIns="91440" bIns="45720" numCol="1" anchor="t" anchorCtr="0" compatLnSpc="1">
-            <a:prstTxWarp prst="textNoShape">
-              <a:avLst/>
-            </a:prstTxWarp>
-          </a:bodyPr>
-          <a:lstStyle/>
-          <a:p>
-            <a:pPr marL="0" marR="0" algn="l">
-              <a:lnSpc>
-                <a:spcPct val="115000"/>
-              </a:lnSpc>
-              <a:spcBef>
-                <a:spcPts val="0"/>
-              </a:spcBef>
-              <a:spcAft>
-                <a:spcPts val="0"/>
-              </a:spcAft>
-            </a:pPr>
-            <a:r>
-              <a:rPr lang="en-US" sz="1400" b="0" dirty="0">
-                <a:solidFill>
-                  <a:srgbClr val="0000FF"/>
-                </a:solidFill>
-                <a:latin typeface="Consolas" pitchFamily="49" charset="0"/>
-                <a:ea typeface="Calibri"/>
-                <a:cs typeface="Consolas" pitchFamily="49" charset="0"/>
-              </a:rPr>
-              <a:t>public</a:t>
-            </a:r>
-            <a:r>
-              <a:rPr lang="en-US" sz="1400" b="0" dirty="0">
-                <a:latin typeface="Consolas" pitchFamily="49" charset="0"/>
-                <a:ea typeface="Calibri"/>
-                <a:cs typeface="Consolas" pitchFamily="49" charset="0"/>
-              </a:rPr>
-              <a:t> </a:t>
-            </a:r>
-            <a:r>
-              <a:rPr lang="en-US" sz="1400" b="0" dirty="0">
-                <a:solidFill>
-                  <a:srgbClr val="0000FF"/>
-                </a:solidFill>
-                <a:latin typeface="Consolas" pitchFamily="49" charset="0"/>
-                <a:ea typeface="Calibri"/>
-                <a:cs typeface="Consolas" pitchFamily="49" charset="0"/>
-              </a:rPr>
-              <a:t>void</a:t>
-            </a:r>
-            <a:r>
-              <a:rPr lang="en-US" sz="1400" b="0" dirty="0">
-                <a:latin typeface="Consolas" pitchFamily="49" charset="0"/>
-                <a:ea typeface="Calibri"/>
-                <a:cs typeface="Consolas" pitchFamily="49" charset="0"/>
-              </a:rPr>
-              <a:t> </a:t>
-            </a:r>
-            <a:r>
-              <a:rPr lang="en-US" sz="1400" b="0" dirty="0" err="1">
-                <a:latin typeface="Consolas" pitchFamily="49" charset="0"/>
-                <a:ea typeface="Calibri"/>
-                <a:cs typeface="Consolas" pitchFamily="49" charset="0"/>
-              </a:rPr>
-              <a:t>IndexAsync</a:t>
-            </a:r>
-            <a:r>
-              <a:rPr lang="en-US" sz="1400" b="0" dirty="0">
-                <a:latin typeface="Consolas" pitchFamily="49" charset="0"/>
-                <a:ea typeface="Calibri"/>
-                <a:cs typeface="Consolas" pitchFamily="49" charset="0"/>
-              </a:rPr>
-              <a:t>() </a:t>
-            </a:r>
-            <a:endParaRPr lang="en-US" sz="1800" b="0" dirty="0">
-              <a:latin typeface="Consolas" pitchFamily="49" charset="0"/>
-              <a:ea typeface="Calibri"/>
-              <a:cs typeface="Consolas" pitchFamily="49" charset="0"/>
-            </a:endParaRPr>
-          </a:p>
-          <a:p>
-            <a:pPr marL="0" marR="0" algn="l">
-              <a:lnSpc>
-                <a:spcPct val="115000"/>
-              </a:lnSpc>
-              <a:spcBef>
-                <a:spcPts val="0"/>
-              </a:spcBef>
-              <a:spcAft>
-                <a:spcPts val="0"/>
-              </a:spcAft>
-            </a:pPr>
-            <a:r>
-              <a:rPr lang="en-US" sz="1400" b="0" dirty="0">
-                <a:latin typeface="Consolas" pitchFamily="49" charset="0"/>
-                <a:ea typeface="Calibri"/>
-                <a:cs typeface="Consolas" pitchFamily="49" charset="0"/>
-              </a:rPr>
-              <a:t>{</a:t>
-            </a:r>
-            <a:endParaRPr lang="en-US" sz="1800" b="0" dirty="0">
-              <a:latin typeface="Consolas" pitchFamily="49" charset="0"/>
-              <a:ea typeface="Calibri"/>
-              <a:cs typeface="Consolas" pitchFamily="49" charset="0"/>
-            </a:endParaRPr>
-          </a:p>
-          <a:p>
-            <a:pPr marL="0" marR="0" algn="l">
-              <a:lnSpc>
-                <a:spcPct val="115000"/>
-              </a:lnSpc>
-              <a:spcBef>
-                <a:spcPts val="0"/>
-              </a:spcBef>
-              <a:spcAft>
-                <a:spcPts val="0"/>
-              </a:spcAft>
-            </a:pPr>
-            <a:r>
-              <a:rPr lang="en-US" sz="1400" b="0" dirty="0">
-                <a:latin typeface="Consolas" pitchFamily="49" charset="0"/>
-                <a:ea typeface="Calibri"/>
-                <a:cs typeface="Consolas" pitchFamily="49" charset="0"/>
-              </a:rPr>
-              <a:t>    </a:t>
-            </a:r>
-            <a:r>
-              <a:rPr lang="en-US" sz="1400" b="0" dirty="0" err="1">
-                <a:solidFill>
-                  <a:srgbClr val="0000FF"/>
-                </a:solidFill>
-                <a:latin typeface="Consolas" pitchFamily="49" charset="0"/>
-                <a:ea typeface="Calibri"/>
-                <a:cs typeface="Consolas" pitchFamily="49" charset="0"/>
-              </a:rPr>
-              <a:t>var</a:t>
-            </a:r>
-            <a:r>
-              <a:rPr lang="en-US" sz="1400" b="0" dirty="0">
-                <a:latin typeface="Consolas" pitchFamily="49" charset="0"/>
-                <a:ea typeface="Calibri"/>
-                <a:cs typeface="Consolas" pitchFamily="49" charset="0"/>
-              </a:rPr>
-              <a:t> client = </a:t>
-            </a:r>
-            <a:r>
-              <a:rPr lang="en-US" sz="1400" b="0" dirty="0">
-                <a:solidFill>
-                  <a:srgbClr val="0000FF"/>
-                </a:solidFill>
-                <a:latin typeface="Consolas" pitchFamily="49" charset="0"/>
-                <a:ea typeface="Calibri"/>
-                <a:cs typeface="Consolas" pitchFamily="49" charset="0"/>
-              </a:rPr>
-              <a:t>new</a:t>
-            </a:r>
-            <a:r>
-              <a:rPr lang="en-US" sz="1400" b="0" dirty="0">
-                <a:latin typeface="Consolas" pitchFamily="49" charset="0"/>
-                <a:ea typeface="Calibri"/>
-                <a:cs typeface="Consolas" pitchFamily="49" charset="0"/>
-              </a:rPr>
-              <a:t> </a:t>
-            </a:r>
-            <a:r>
-              <a:rPr lang="en-US" sz="1400" b="0" dirty="0" err="1">
-                <a:solidFill>
-                  <a:srgbClr val="2B91AF"/>
-                </a:solidFill>
-                <a:latin typeface="Consolas" pitchFamily="49" charset="0"/>
-                <a:ea typeface="Calibri"/>
-                <a:cs typeface="Consolas" pitchFamily="49" charset="0"/>
-              </a:rPr>
-              <a:t>NewsServiceClient</a:t>
-            </a:r>
-            <a:r>
-              <a:rPr lang="en-US" sz="1400" b="0" dirty="0">
-                <a:latin typeface="Consolas" pitchFamily="49" charset="0"/>
-                <a:ea typeface="Calibri"/>
-                <a:cs typeface="Consolas" pitchFamily="49" charset="0"/>
-              </a:rPr>
-              <a:t>();</a:t>
-            </a:r>
-            <a:endParaRPr lang="en-US" sz="1800" b="0" dirty="0">
-              <a:latin typeface="Consolas" pitchFamily="49" charset="0"/>
-              <a:ea typeface="Calibri"/>
-              <a:cs typeface="Consolas" pitchFamily="49" charset="0"/>
-            </a:endParaRPr>
-          </a:p>
-          <a:p>
-            <a:pPr marL="0" marR="0" algn="l">
-              <a:lnSpc>
-                <a:spcPct val="115000"/>
-              </a:lnSpc>
-              <a:spcBef>
-                <a:spcPts val="0"/>
-              </a:spcBef>
-              <a:spcAft>
-                <a:spcPts val="0"/>
-              </a:spcAft>
-            </a:pPr>
-            <a:r>
-              <a:rPr lang="en-US" sz="1400" b="0" dirty="0">
-                <a:latin typeface="Consolas" pitchFamily="49" charset="0"/>
-                <a:ea typeface="Calibri"/>
-                <a:cs typeface="Consolas" pitchFamily="49" charset="0"/>
-              </a:rPr>
-              <a:t>    </a:t>
-            </a:r>
-            <a:r>
-              <a:rPr lang="en-US" sz="1400" b="0" dirty="0" err="1">
-                <a:latin typeface="Consolas" pitchFamily="49" charset="0"/>
-                <a:ea typeface="Calibri"/>
-                <a:cs typeface="Consolas" pitchFamily="49" charset="0"/>
-              </a:rPr>
-              <a:t>AsyncManager.OutstandingOperations.Increment</a:t>
-            </a:r>
-            <a:r>
-              <a:rPr lang="en-US" sz="1400" b="0" dirty="0">
-                <a:latin typeface="Consolas" pitchFamily="49" charset="0"/>
-                <a:ea typeface="Calibri"/>
-                <a:cs typeface="Consolas" pitchFamily="49" charset="0"/>
-              </a:rPr>
-              <a:t>();</a:t>
-            </a:r>
-            <a:endParaRPr lang="en-US" sz="1800" b="0" dirty="0">
-              <a:latin typeface="Consolas" pitchFamily="49" charset="0"/>
-              <a:ea typeface="Calibri"/>
-              <a:cs typeface="Consolas" pitchFamily="49" charset="0"/>
-            </a:endParaRPr>
-          </a:p>
-          <a:p>
-            <a:pPr marL="0" marR="0" algn="l">
-              <a:lnSpc>
-                <a:spcPct val="115000"/>
-              </a:lnSpc>
-              <a:spcBef>
-                <a:spcPts val="0"/>
-              </a:spcBef>
-              <a:spcAft>
-                <a:spcPts val="0"/>
-              </a:spcAft>
-            </a:pPr>
-            <a:r>
-              <a:rPr lang="en-US" sz="1400" b="0" dirty="0">
-                <a:latin typeface="Consolas" pitchFamily="49" charset="0"/>
-                <a:ea typeface="Calibri"/>
-                <a:cs typeface="Consolas" pitchFamily="49" charset="0"/>
-              </a:rPr>
-              <a:t>    </a:t>
-            </a:r>
-            <a:r>
-              <a:rPr lang="en-US" sz="1400" b="0" dirty="0" err="1">
-                <a:latin typeface="Consolas" pitchFamily="49" charset="0"/>
-                <a:ea typeface="Calibri"/>
-                <a:cs typeface="Consolas" pitchFamily="49" charset="0"/>
-              </a:rPr>
-              <a:t>client.GetNewsCompleted</a:t>
-            </a:r>
-            <a:r>
-              <a:rPr lang="en-US" sz="1400" b="0" dirty="0">
-                <a:latin typeface="Consolas" pitchFamily="49" charset="0"/>
-                <a:ea typeface="Calibri"/>
-                <a:cs typeface="Consolas" pitchFamily="49" charset="0"/>
-              </a:rPr>
-              <a:t> += (s, e) =&gt; {</a:t>
-            </a:r>
-            <a:endParaRPr lang="en-US" sz="1800" b="0" dirty="0">
-              <a:latin typeface="Consolas" pitchFamily="49" charset="0"/>
-              <a:ea typeface="Calibri"/>
-              <a:cs typeface="Consolas" pitchFamily="49" charset="0"/>
-            </a:endParaRPr>
-          </a:p>
-          <a:p>
-            <a:pPr marL="0" marR="0" algn="l">
-              <a:lnSpc>
-                <a:spcPct val="115000"/>
-              </a:lnSpc>
-              <a:spcBef>
-                <a:spcPts val="0"/>
-              </a:spcBef>
-              <a:spcAft>
-                <a:spcPts val="0"/>
-              </a:spcAft>
-            </a:pPr>
-            <a:r>
-              <a:rPr lang="en-US" sz="1400" b="0" dirty="0">
-                <a:latin typeface="Consolas" pitchFamily="49" charset="0"/>
-                <a:ea typeface="Calibri"/>
-                <a:cs typeface="Consolas" pitchFamily="49" charset="0"/>
-              </a:rPr>
-              <a:t>        </a:t>
-            </a:r>
-            <a:r>
-              <a:rPr lang="en-US" sz="1400" b="0" dirty="0" err="1">
-                <a:latin typeface="Consolas" pitchFamily="49" charset="0"/>
-                <a:ea typeface="Calibri"/>
-                <a:cs typeface="Consolas" pitchFamily="49" charset="0"/>
-              </a:rPr>
-              <a:t>AsyncManager.Parameters</a:t>
-            </a:r>
-            <a:r>
-              <a:rPr lang="en-US" sz="1400" b="0" dirty="0">
-                <a:latin typeface="Consolas" pitchFamily="49" charset="0"/>
-                <a:ea typeface="Calibri"/>
-                <a:cs typeface="Consolas" pitchFamily="49" charset="0"/>
-              </a:rPr>
-              <a:t>[</a:t>
-            </a:r>
-            <a:r>
-              <a:rPr lang="en-US" sz="1400" b="0" dirty="0">
-                <a:solidFill>
-                  <a:srgbClr val="A31515"/>
-                </a:solidFill>
-                <a:latin typeface="Consolas" pitchFamily="49" charset="0"/>
-                <a:ea typeface="Calibri"/>
-                <a:cs typeface="Consolas" pitchFamily="49" charset="0"/>
-              </a:rPr>
-              <a:t>"news"</a:t>
-            </a:r>
-            <a:r>
-              <a:rPr lang="en-US" sz="1400" b="0" dirty="0">
-                <a:latin typeface="Consolas" pitchFamily="49" charset="0"/>
-                <a:ea typeface="Calibri"/>
-                <a:cs typeface="Consolas" pitchFamily="49" charset="0"/>
-              </a:rPr>
-              <a:t>] = </a:t>
-            </a:r>
-            <a:r>
-              <a:rPr lang="en-US" sz="1400" b="0" dirty="0" err="1">
-                <a:latin typeface="Consolas" pitchFamily="49" charset="0"/>
-                <a:ea typeface="Calibri"/>
-                <a:cs typeface="Consolas" pitchFamily="49" charset="0"/>
-              </a:rPr>
-              <a:t>e.Result</a:t>
-            </a:r>
-            <a:r>
-              <a:rPr lang="en-US" sz="1400" b="0" dirty="0">
-                <a:latin typeface="Consolas" pitchFamily="49" charset="0"/>
-                <a:ea typeface="Calibri"/>
-                <a:cs typeface="Consolas" pitchFamily="49" charset="0"/>
-              </a:rPr>
-              <a:t>;</a:t>
-            </a:r>
-            <a:endParaRPr lang="en-US" sz="1800" b="0" dirty="0">
-              <a:latin typeface="Consolas" pitchFamily="49" charset="0"/>
-              <a:ea typeface="Calibri"/>
-              <a:cs typeface="Consolas" pitchFamily="49" charset="0"/>
-            </a:endParaRPr>
-          </a:p>
-          <a:p>
-            <a:pPr marL="0" marR="0" algn="l">
-              <a:lnSpc>
-                <a:spcPct val="115000"/>
-              </a:lnSpc>
-              <a:spcBef>
-                <a:spcPts val="0"/>
-              </a:spcBef>
-              <a:spcAft>
-                <a:spcPts val="0"/>
-              </a:spcAft>
-            </a:pPr>
-            <a:r>
-              <a:rPr lang="en-US" sz="1400" b="0" dirty="0">
-                <a:latin typeface="Consolas" pitchFamily="49" charset="0"/>
-                <a:ea typeface="Calibri"/>
-                <a:cs typeface="Consolas" pitchFamily="49" charset="0"/>
-              </a:rPr>
-              <a:t>        </a:t>
-            </a:r>
-            <a:r>
-              <a:rPr lang="en-US" sz="1400" b="0" dirty="0" err="1">
-                <a:latin typeface="Consolas" pitchFamily="49" charset="0"/>
-                <a:ea typeface="Calibri"/>
-                <a:cs typeface="Consolas" pitchFamily="49" charset="0"/>
-              </a:rPr>
-              <a:t>AsyncManager.OutstandingOperations.Decrement</a:t>
-            </a:r>
-            <a:r>
-              <a:rPr lang="en-US" sz="1400" b="0" dirty="0">
-                <a:latin typeface="Consolas" pitchFamily="49" charset="0"/>
-                <a:ea typeface="Calibri"/>
-                <a:cs typeface="Consolas" pitchFamily="49" charset="0"/>
-              </a:rPr>
-              <a:t>();</a:t>
-            </a:r>
-            <a:endParaRPr lang="en-US" sz="1800" b="0" dirty="0">
-              <a:latin typeface="Consolas" pitchFamily="49" charset="0"/>
-              <a:ea typeface="Calibri"/>
-              <a:cs typeface="Consolas" pitchFamily="49" charset="0"/>
-            </a:endParaRPr>
-          </a:p>
-          <a:p>
-            <a:pPr marL="0" marR="0" algn="l">
-              <a:lnSpc>
-                <a:spcPct val="115000"/>
-              </a:lnSpc>
-              <a:spcBef>
-                <a:spcPts val="0"/>
-              </a:spcBef>
-              <a:spcAft>
-                <a:spcPts val="0"/>
-              </a:spcAft>
-            </a:pPr>
-            <a:r>
-              <a:rPr lang="en-US" sz="1400" b="0" dirty="0">
-                <a:latin typeface="Consolas" pitchFamily="49" charset="0"/>
-                <a:ea typeface="Calibri"/>
-                <a:cs typeface="Consolas" pitchFamily="49" charset="0"/>
-              </a:rPr>
-              <a:t>    };</a:t>
-            </a:r>
-            <a:endParaRPr lang="en-US" sz="1800" b="0" dirty="0">
-              <a:latin typeface="Consolas" pitchFamily="49" charset="0"/>
-              <a:ea typeface="Calibri"/>
-              <a:cs typeface="Consolas" pitchFamily="49" charset="0"/>
-            </a:endParaRPr>
-          </a:p>
-          <a:p>
-            <a:pPr marL="0" marR="0" algn="l">
-              <a:lnSpc>
-                <a:spcPct val="115000"/>
-              </a:lnSpc>
-              <a:spcBef>
-                <a:spcPts val="0"/>
-              </a:spcBef>
-              <a:spcAft>
-                <a:spcPts val="0"/>
-              </a:spcAft>
-            </a:pPr>
-            <a:r>
-              <a:rPr lang="en-US" sz="1400" b="0" dirty="0">
-                <a:latin typeface="Consolas" pitchFamily="49" charset="0"/>
-                <a:ea typeface="Calibri"/>
-                <a:cs typeface="Consolas" pitchFamily="49" charset="0"/>
-              </a:rPr>
-              <a:t>    </a:t>
-            </a:r>
-            <a:r>
-              <a:rPr lang="en-US" sz="1400" b="0" dirty="0" err="1">
-                <a:latin typeface="Consolas" pitchFamily="49" charset="0"/>
-                <a:ea typeface="Calibri"/>
-                <a:cs typeface="Consolas" pitchFamily="49" charset="0"/>
-              </a:rPr>
-              <a:t>client.GetNewsAsync</a:t>
-            </a:r>
-            <a:r>
-              <a:rPr lang="en-US" sz="1400" b="0" dirty="0">
-                <a:latin typeface="Consolas" pitchFamily="49" charset="0"/>
-                <a:ea typeface="Calibri"/>
-                <a:cs typeface="Consolas" pitchFamily="49" charset="0"/>
-              </a:rPr>
-              <a:t>();            </a:t>
-            </a:r>
-            <a:endParaRPr lang="en-US" sz="1800" b="0" dirty="0">
-              <a:latin typeface="Consolas" pitchFamily="49" charset="0"/>
-              <a:ea typeface="Calibri"/>
-              <a:cs typeface="Consolas" pitchFamily="49" charset="0"/>
-            </a:endParaRPr>
-          </a:p>
-          <a:p>
-            <a:pPr marL="0" marR="0" algn="l">
-              <a:lnSpc>
-                <a:spcPct val="115000"/>
-              </a:lnSpc>
-              <a:spcBef>
-                <a:spcPts val="0"/>
-              </a:spcBef>
-              <a:spcAft>
-                <a:spcPts val="0"/>
-              </a:spcAft>
-            </a:pPr>
-            <a:r>
-              <a:rPr lang="en-US" sz="1400" b="0" dirty="0">
-                <a:latin typeface="Consolas" pitchFamily="49" charset="0"/>
-                <a:ea typeface="Calibri"/>
-                <a:cs typeface="Consolas" pitchFamily="49" charset="0"/>
-              </a:rPr>
-              <a:t>}</a:t>
-            </a:r>
-            <a:endParaRPr lang="en-US" sz="1800" b="0" dirty="0">
-              <a:latin typeface="Consolas" pitchFamily="49" charset="0"/>
-              <a:ea typeface="Calibri"/>
-              <a:cs typeface="Consolas" pitchFamily="49" charset="0"/>
-            </a:endParaRPr>
-          </a:p>
-          <a:p>
-            <a:pPr marL="0" marR="0" algn="l">
-              <a:lnSpc>
-                <a:spcPct val="115000"/>
-              </a:lnSpc>
-              <a:spcBef>
-                <a:spcPts val="0"/>
-              </a:spcBef>
-              <a:spcAft>
-                <a:spcPts val="0"/>
-              </a:spcAft>
-            </a:pPr>
-            <a:endParaRPr kumimoji="0" lang="en-US" sz="1400" b="0" i="0" u="none" strike="noStrike" kern="0" cap="none" spc="0" normalizeH="0" baseline="0" noProof="0" dirty="0">
-              <a:ln>
-                <a:noFill/>
-              </a:ln>
-              <a:solidFill>
-                <a:schemeClr val="tx1"/>
-              </a:solidFill>
-              <a:effectLst/>
-              <a:uLnTx/>
-              <a:uFillTx/>
-              <a:latin typeface="Consolas" pitchFamily="49" charset="0"/>
-              <a:cs typeface="Consolas" pitchFamily="49" charset="0"/>
-            </a:endParaRPr>
-          </a:p>
-        </p:txBody>
-      </p:sp>
-      <p:sp>
-        <p:nvSpPr>
-          <p:cNvPr id="6" name="Text Placeholder 2"/>
-          <p:cNvSpPr txBox="1">
-            <a:spLocks/>
-          </p:cNvSpPr>
-          <p:nvPr/>
-        </p:nvSpPr>
-        <p:spPr bwMode="auto">
-          <a:xfrm>
-            <a:off x="3886200" y="4800600"/>
-            <a:ext cx="5105400" cy="1219200"/>
-          </a:xfrm>
-          <a:prstGeom prst="rect">
-            <a:avLst/>
-          </a:prstGeom>
-          <a:solidFill>
-            <a:schemeClr val="accent3"/>
-          </a:solidFill>
-          <a:ln w="9525">
-            <a:solidFill>
-              <a:schemeClr val="tx1"/>
-            </a:solidFill>
-            <a:miter lim="800000"/>
-            <a:headEnd/>
-            <a:tailEnd/>
-          </a:ln>
-        </p:spPr>
-        <p:txBody>
-          <a:bodyPr vert="horz" wrap="square" lIns="91440" tIns="45720" rIns="91440" bIns="45720" numCol="1" anchor="t" anchorCtr="0" compatLnSpc="1">
-            <a:prstTxWarp prst="textNoShape">
-              <a:avLst/>
-            </a:prstTxWarp>
-          </a:bodyPr>
-          <a:lstStyle/>
-          <a:p>
-            <a:pPr algn="l"/>
-            <a:r>
-              <a:rPr lang="en-US" sz="1400" b="0" dirty="0">
-                <a:solidFill>
-                  <a:srgbClr val="0000FF"/>
-                </a:solidFill>
-                <a:latin typeface="Consolas"/>
-              </a:rPr>
-              <a:t>public</a:t>
-            </a:r>
-            <a:r>
-              <a:rPr lang="en-US" sz="1400" b="0" dirty="0">
-                <a:solidFill>
-                  <a:prstClr val="black"/>
-                </a:solidFill>
-                <a:latin typeface="Consolas"/>
-              </a:rPr>
-              <a:t> </a:t>
-            </a:r>
-            <a:r>
-              <a:rPr lang="en-US" sz="1400" b="0" dirty="0" err="1">
-                <a:solidFill>
-                  <a:srgbClr val="2B91AF"/>
-                </a:solidFill>
-                <a:latin typeface="Consolas"/>
-              </a:rPr>
-              <a:t>ActionResult</a:t>
-            </a:r>
-            <a:r>
-              <a:rPr lang="en-US" sz="1400" b="0" dirty="0">
-                <a:solidFill>
-                  <a:prstClr val="black"/>
-                </a:solidFill>
-                <a:latin typeface="Consolas"/>
-              </a:rPr>
-              <a:t> </a:t>
-            </a:r>
-            <a:r>
-              <a:rPr lang="en-US" sz="1400" b="0" dirty="0" err="1">
-                <a:solidFill>
-                  <a:prstClr val="black"/>
-                </a:solidFill>
-                <a:latin typeface="Consolas"/>
-              </a:rPr>
-              <a:t>IndexCompleted</a:t>
-            </a:r>
-            <a:r>
-              <a:rPr lang="en-US" sz="1400" b="0" dirty="0">
-                <a:solidFill>
-                  <a:prstClr val="black"/>
-                </a:solidFill>
-                <a:latin typeface="Consolas"/>
-              </a:rPr>
-              <a:t>(</a:t>
-            </a:r>
-            <a:r>
-              <a:rPr lang="en-US" sz="1400" b="0" dirty="0">
-                <a:solidFill>
-                  <a:srgbClr val="0000FF"/>
-                </a:solidFill>
-                <a:latin typeface="Consolas"/>
-              </a:rPr>
-              <a:t>object</a:t>
-            </a:r>
-            <a:r>
-              <a:rPr lang="en-US" sz="1400" b="0" dirty="0">
-                <a:solidFill>
-                  <a:prstClr val="black"/>
-                </a:solidFill>
-                <a:latin typeface="Consolas"/>
-              </a:rPr>
-              <a:t> news)</a:t>
-            </a:r>
-          </a:p>
-          <a:p>
-            <a:pPr algn="l"/>
-            <a:r>
-              <a:rPr lang="en-US" sz="1400" b="0" dirty="0">
-                <a:solidFill>
-                  <a:prstClr val="black"/>
-                </a:solidFill>
-                <a:latin typeface="Consolas"/>
-              </a:rPr>
-              <a:t>{</a:t>
-            </a:r>
-          </a:p>
-          <a:p>
-            <a:pPr algn="l"/>
-            <a:r>
-              <a:rPr lang="en-US" sz="1400" b="0" dirty="0">
-                <a:solidFill>
-                  <a:prstClr val="black"/>
-                </a:solidFill>
-                <a:latin typeface="Consolas"/>
-              </a:rPr>
-              <a:t>    </a:t>
-            </a:r>
-            <a:r>
-              <a:rPr lang="en-US" sz="1400" b="0" dirty="0" smtClean="0">
-                <a:solidFill>
-                  <a:srgbClr val="0000FF"/>
-                </a:solidFill>
-                <a:latin typeface="Consolas"/>
-              </a:rPr>
-              <a:t>return</a:t>
-            </a:r>
-            <a:r>
-              <a:rPr lang="en-US" sz="1400" b="0" dirty="0" smtClean="0">
-                <a:solidFill>
-                  <a:prstClr val="black"/>
-                </a:solidFill>
-                <a:latin typeface="Consolas"/>
-              </a:rPr>
-              <a:t> View(news</a:t>
-            </a:r>
-            <a:r>
-              <a:rPr lang="en-US" sz="1400" b="0" dirty="0">
-                <a:solidFill>
-                  <a:prstClr val="black"/>
-                </a:solidFill>
-                <a:latin typeface="Consolas"/>
-              </a:rPr>
-              <a:t>);</a:t>
-            </a:r>
-          </a:p>
-          <a:p>
-            <a:pPr algn="l"/>
-            <a:r>
-              <a:rPr lang="en-US" sz="1400" b="0" dirty="0">
-                <a:solidFill>
-                  <a:prstClr val="black"/>
-                </a:solidFill>
-                <a:latin typeface="Consolas"/>
-              </a:rPr>
-              <a:t>}</a:t>
-            </a:r>
-          </a:p>
-          <a:p>
-            <a:pPr marL="0" marR="0" algn="l">
-              <a:lnSpc>
-                <a:spcPct val="115000"/>
-              </a:lnSpc>
-              <a:spcBef>
-                <a:spcPts val="0"/>
-              </a:spcBef>
-              <a:spcAft>
-                <a:spcPts val="0"/>
-              </a:spcAft>
-            </a:pPr>
-            <a:endParaRPr kumimoji="0" lang="en-US" sz="1400" b="0" i="0" u="none" strike="noStrike" kern="0" cap="none" spc="0" normalizeH="0" baseline="0" noProof="0" dirty="0">
-              <a:ln>
-                <a:noFill/>
-              </a:ln>
-              <a:solidFill>
-                <a:schemeClr val="tx1"/>
-              </a:solidFill>
-              <a:effectLst/>
-              <a:uLnTx/>
-              <a:uFillTx/>
-              <a:latin typeface="Consolas" pitchFamily="49" charset="0"/>
-              <a:cs typeface="Segoe UI" pitchFamily="34" charset="0"/>
-            </a:endParaRPr>
-          </a:p>
-        </p:txBody>
-      </p:sp>
-      <p:sp>
-        <p:nvSpPr>
-          <p:cNvPr id="7" name="Right Arrow 6"/>
-          <p:cNvSpPr/>
-          <p:nvPr/>
-        </p:nvSpPr>
-        <p:spPr bwMode="auto">
-          <a:xfrm>
-            <a:off x="5181600" y="1524000"/>
-            <a:ext cx="685800" cy="381000"/>
-          </a:xfrm>
-          <a:prstGeom prst="rightArrow">
-            <a:avLst/>
-          </a:prstGeom>
-          <a:gradFill rotWithShape="1">
-            <a:gsLst>
-              <a:gs pos="0">
-                <a:srgbClr val="A4D289"/>
-              </a:gs>
-              <a:gs pos="100000">
-                <a:schemeClr val="bg1"/>
-              </a:gs>
-            </a:gsLst>
-            <a:lin ang="5400000" scaled="1"/>
-          </a:gradFill>
-          <a:ln w="9525" algn="ctr">
-            <a:solidFill>
-              <a:schemeClr val="tx1"/>
-            </a:solidFill>
-            <a:miter lim="800000"/>
-            <a:headEnd/>
-            <a:tailEnd/>
-          </a:ln>
-          <a:effectLst>
-            <a:outerShdw blurRad="50800" dist="38100" dir="2700000" algn="tl" rotWithShape="0">
-              <a:prstClr val="black">
-                <a:alpha val="40000"/>
-              </a:prstClr>
-            </a:outerShdw>
-          </a:effectLst>
-        </p:spPr>
-        <p:txBody>
-          <a:bodyPr wrap="none" rtlCol="0" anchor="ctr"/>
-          <a:lstStyle/>
-          <a:p>
-            <a:pPr algn="ctr"/>
-            <a:endParaRPr lang="en-US" sz="2000" dirty="0">
-              <a:latin typeface="Tekton Pro" pitchFamily="34" charset="0"/>
-            </a:endParaRPr>
-          </a:p>
-        </p:txBody>
-      </p:sp>
-    </p:spTree>
-    <p:extLst>
-      <p:ext uri="{BB962C8B-B14F-4D97-AF65-F5344CB8AC3E}">
-        <p14:creationId xmlns:p14="http://schemas.microsoft.com/office/powerpoint/2010/main" val="70110697"/>
-      </p:ext>
-    </p:extLst>
-  </p:cSld>
-  <p:clrMapOvr>
-    <a:masterClrMapping/>
-  </p:clrMapOvr>
-  <p:transition>
-    <p:fade/>
-  </p:transition>
-  <p:timing>
-    <p:tnLst>
-      <p:par>
-        <p:cTn id="1" dur="indefinite" restart="never" nodeType="tmRoot"/>
-      </p:par>
-    </p:tnLst>
-  </p:timing>
-</p:sld>
-</file>
-
-<file path=ppt/slides/slide17.xml><?xml version="1.0" encoding="utf-8"?>
 <p:sld xmlns:a="http://schemas.openxmlformats.org/drawingml/2006/main" xmlns:r="http://schemas.openxmlformats.org/officeDocument/2006/relationships" xmlns:p="http://schemas.openxmlformats.org/presentationml/2006/main">
   <p:cSld>
     <p:spTree>
@@ -7918,7 +7004,7 @@
 </p:sld>
 </file>
 
-<file path=ppt/slides/slide18.xml><?xml version="1.0" encoding="utf-8"?>
+<file path=ppt/slides/slide17.xml><?xml version="1.0" encoding="utf-8"?>
 <p:sld xmlns:a="http://schemas.openxmlformats.org/drawingml/2006/main" xmlns:r="http://schemas.openxmlformats.org/officeDocument/2006/relationships" xmlns:p="http://schemas.openxmlformats.org/presentationml/2006/main">
   <p:cSld>
     <p:spTree>
@@ -9229,7 +8315,7 @@
 </p:sld>
 </file>
 
-<file path=ppt/slides/slide19.xml><?xml version="1.0" encoding="utf-8"?>
+<file path=ppt/slides/slide18.xml><?xml version="1.0" encoding="utf-8"?>
 <p:sld xmlns:a="http://schemas.openxmlformats.org/drawingml/2006/main" xmlns:r="http://schemas.openxmlformats.org/officeDocument/2006/relationships" xmlns:p="http://schemas.openxmlformats.org/presentationml/2006/main">
   <p:cSld>
     <p:spTree>
@@ -9916,6 +9002,134 @@
 </p:sld>
 </file>
 
+<file path=ppt/slides/slide19.xml><?xml version="1.0" encoding="utf-8"?>
+<p:sld xmlns:a="http://schemas.openxmlformats.org/drawingml/2006/main" xmlns:r="http://schemas.openxmlformats.org/officeDocument/2006/relationships" xmlns:p="http://schemas.openxmlformats.org/presentationml/2006/main">
+  <p:cSld>
+    <p:spTree>
+      <p:nvGrpSpPr>
+        <p:cNvPr id="1" name=""/>
+        <p:cNvGrpSpPr/>
+        <p:nvPr/>
+      </p:nvGrpSpPr>
+      <p:grpSpPr>
+        <a:xfrm>
+          <a:off x="0" y="0"/>
+          <a:ext cx="0" cy="0"/>
+          <a:chOff x="0" y="0"/>
+          <a:chExt cx="0" cy="0"/>
+        </a:xfrm>
+      </p:grpSpPr>
+      <p:sp>
+        <p:nvSpPr>
+          <p:cNvPr id="12290" name="Rectangle 4"/>
+          <p:cNvSpPr>
+            <a:spLocks noGrp="1" noChangeArrowheads="1"/>
+          </p:cNvSpPr>
+          <p:nvPr>
+            <p:ph type="title"/>
+          </p:nvPr>
+        </p:nvSpPr>
+        <p:spPr/>
+        <p:txBody>
+          <a:bodyPr/>
+          <a:lstStyle/>
+          <a:p>
+            <a:pPr eaLnBrk="1" hangingPunct="1"/>
+            <a:r>
+              <a:rPr lang="en-US" dirty="0" smtClean="0"/>
+              <a:t>Summary</a:t>
+            </a:r>
+          </a:p>
+        </p:txBody>
+      </p:sp>
+      <p:sp>
+        <p:nvSpPr>
+          <p:cNvPr id="12291" name="Rectangle 5"/>
+          <p:cNvSpPr>
+            <a:spLocks noGrp="1" noChangeArrowheads="1"/>
+          </p:cNvSpPr>
+          <p:nvPr>
+            <p:ph type="body" idx="1"/>
+          </p:nvPr>
+        </p:nvSpPr>
+        <p:spPr/>
+        <p:txBody>
+          <a:bodyPr/>
+          <a:lstStyle/>
+          <a:p>
+            <a:pPr eaLnBrk="1" hangingPunct="1"/>
+            <a:r>
+              <a:rPr lang="en-US" dirty="0" smtClean="0"/>
+              <a:t>Controllers are the lynchpins</a:t>
+            </a:r>
+          </a:p>
+          <a:p>
+            <a:pPr lvl="1"/>
+            <a:r>
+              <a:rPr lang="en-US" dirty="0" err="1" smtClean="0"/>
+              <a:t>IController</a:t>
+            </a:r>
+            <a:r>
+              <a:rPr lang="en-US" dirty="0" smtClean="0"/>
+              <a:t> defines an Execute method</a:t>
+            </a:r>
+          </a:p>
+          <a:p>
+            <a:pPr lvl="1"/>
+            <a:r>
+              <a:rPr lang="en-US" dirty="0" smtClean="0"/>
+              <a:t>Controller class defines a rich execution model</a:t>
+            </a:r>
+          </a:p>
+          <a:p>
+            <a:r>
+              <a:rPr lang="en-US" dirty="0" smtClean="0"/>
+              <a:t>Controller built by a factory</a:t>
+            </a:r>
+          </a:p>
+          <a:p>
+            <a:r>
+              <a:rPr lang="en-US" dirty="0" smtClean="0"/>
+              <a:t>Actions invoked by name</a:t>
+            </a:r>
+          </a:p>
+          <a:p>
+            <a:r>
+              <a:rPr lang="en-US" dirty="0" smtClean="0"/>
+              <a:t>Extensible set of action selectors and action filters</a:t>
+            </a:r>
+          </a:p>
+          <a:p>
+            <a:r>
+              <a:rPr lang="en-US" dirty="0" smtClean="0"/>
+              <a:t>Variety of </a:t>
+            </a:r>
+            <a:r>
+              <a:rPr lang="en-US" dirty="0" err="1" smtClean="0"/>
+              <a:t>ActionResults</a:t>
+            </a:r>
+            <a:endParaRPr lang="en-US" dirty="0" smtClean="0"/>
+          </a:p>
+        </p:txBody>
+      </p:sp>
+    </p:spTree>
+  </p:cSld>
+  <p:clrMapOvr>
+    <a:masterClrMapping/>
+  </p:clrMapOvr>
+  <p:transition>
+    <p:fade/>
+  </p:transition>
+  <p:timing>
+    <p:tnLst>
+      <p:par>
+        <p:cTn id="1" dur="indefinite" restart="never" nodeType="tmRoot"/>
+      </p:par>
+    </p:tnLst>
+  </p:timing>
+</p:sld>
+</file>
+
 <file path=ppt/slides/slide2.xml><?xml version="1.0" encoding="utf-8"?>
 <p:sld xmlns:a="http://schemas.openxmlformats.org/drawingml/2006/main" xmlns:r="http://schemas.openxmlformats.org/officeDocument/2006/relationships" xmlns:p="http://schemas.openxmlformats.org/presentationml/2006/main">
   <p:cSld>
@@ -10017,134 +9231,6 @@
           </a:p>
           <a:p>
             <a:pPr eaLnBrk="1" hangingPunct="1"/>
-            <a:endParaRPr lang="en-US" dirty="0" smtClean="0"/>
-          </a:p>
-        </p:txBody>
-      </p:sp>
-    </p:spTree>
-  </p:cSld>
-  <p:clrMapOvr>
-    <a:masterClrMapping/>
-  </p:clrMapOvr>
-  <p:transition>
-    <p:fade/>
-  </p:transition>
-  <p:timing>
-    <p:tnLst>
-      <p:par>
-        <p:cTn id="1" dur="indefinite" restart="never" nodeType="tmRoot"/>
-      </p:par>
-    </p:tnLst>
-  </p:timing>
-</p:sld>
-</file>
-
-<file path=ppt/slides/slide20.xml><?xml version="1.0" encoding="utf-8"?>
-<p:sld xmlns:a="http://schemas.openxmlformats.org/drawingml/2006/main" xmlns:r="http://schemas.openxmlformats.org/officeDocument/2006/relationships" xmlns:p="http://schemas.openxmlformats.org/presentationml/2006/main">
-  <p:cSld>
-    <p:spTree>
-      <p:nvGrpSpPr>
-        <p:cNvPr id="1" name=""/>
-        <p:cNvGrpSpPr/>
-        <p:nvPr/>
-      </p:nvGrpSpPr>
-      <p:grpSpPr>
-        <a:xfrm>
-          <a:off x="0" y="0"/>
-          <a:ext cx="0" cy="0"/>
-          <a:chOff x="0" y="0"/>
-          <a:chExt cx="0" cy="0"/>
-        </a:xfrm>
-      </p:grpSpPr>
-      <p:sp>
-        <p:nvSpPr>
-          <p:cNvPr id="12290" name="Rectangle 4"/>
-          <p:cNvSpPr>
-            <a:spLocks noGrp="1" noChangeArrowheads="1"/>
-          </p:cNvSpPr>
-          <p:nvPr>
-            <p:ph type="title"/>
-          </p:nvPr>
-        </p:nvSpPr>
-        <p:spPr/>
-        <p:txBody>
-          <a:bodyPr/>
-          <a:lstStyle/>
-          <a:p>
-            <a:pPr eaLnBrk="1" hangingPunct="1"/>
-            <a:r>
-              <a:rPr lang="en-US" dirty="0" smtClean="0"/>
-              <a:t>Summary</a:t>
-            </a:r>
-          </a:p>
-        </p:txBody>
-      </p:sp>
-      <p:sp>
-        <p:nvSpPr>
-          <p:cNvPr id="12291" name="Rectangle 5"/>
-          <p:cNvSpPr>
-            <a:spLocks noGrp="1" noChangeArrowheads="1"/>
-          </p:cNvSpPr>
-          <p:nvPr>
-            <p:ph type="body" idx="1"/>
-          </p:nvPr>
-        </p:nvSpPr>
-        <p:spPr/>
-        <p:txBody>
-          <a:bodyPr/>
-          <a:lstStyle/>
-          <a:p>
-            <a:pPr eaLnBrk="1" hangingPunct="1"/>
-            <a:r>
-              <a:rPr lang="en-US" dirty="0" smtClean="0"/>
-              <a:t>Controllers are the lynchpins</a:t>
-            </a:r>
-          </a:p>
-          <a:p>
-            <a:pPr lvl="1"/>
-            <a:r>
-              <a:rPr lang="en-US" dirty="0" err="1" smtClean="0"/>
-              <a:t>IController</a:t>
-            </a:r>
-            <a:r>
-              <a:rPr lang="en-US" dirty="0" smtClean="0"/>
-              <a:t> defines an Execute method</a:t>
-            </a:r>
-          </a:p>
-          <a:p>
-            <a:pPr lvl="1"/>
-            <a:r>
-              <a:rPr lang="en-US" dirty="0" smtClean="0"/>
-              <a:t>Controller class defines a rich execution model</a:t>
-            </a:r>
-          </a:p>
-          <a:p>
-            <a:r>
-              <a:rPr lang="en-US" dirty="0" smtClean="0"/>
-              <a:t>Controller built by a factory</a:t>
-            </a:r>
-          </a:p>
-          <a:p>
-            <a:r>
-              <a:rPr lang="en-US" dirty="0" smtClean="0"/>
-              <a:t>Actions invoked by name</a:t>
-            </a:r>
-          </a:p>
-          <a:p>
-            <a:r>
-              <a:rPr lang="en-US" dirty="0" smtClean="0"/>
-              <a:t>Extensible set of action selectors and action filters</a:t>
-            </a:r>
-          </a:p>
-          <a:p>
-            <a:r>
-              <a:rPr lang="en-US" dirty="0" smtClean="0"/>
-              <a:t>Variety of </a:t>
-            </a:r>
-            <a:r>
-              <a:rPr lang="en-US" dirty="0" err="1" smtClean="0"/>
-              <a:t>ActionResults</a:t>
-            </a:r>
             <a:endParaRPr lang="en-US" dirty="0" smtClean="0"/>
           </a:p>
         </p:txBody>
@@ -13992,7 +13078,7 @@
         </p:blipFill>
         <p:spPr bwMode="auto">
           <a:xfrm>
-            <a:off x="6767513" y="1600200"/>
+            <a:off x="6477000" y="1600200"/>
             <a:ext cx="2376487" cy="4022768"/>
           </a:xfrm>
           <a:prstGeom prst="rect">

</xml_diff>